<commit_message>
Presentation: Added more descriptions
</commit_message>
<xml_diff>
--- a/Presentation/Merlot Client Information System.pptx
+++ b/Presentation/Merlot Client Information System.pptx
@@ -206,7 +206,7 @@
           <a:p>
             <a:fld id="{328EC953-C310-4CBE-9A3C-455FA93F825E}" type="datetimeFigureOut">
               <a:rPr lang="en-ZA" smtClean="0"/>
-              <a:t>2019-04-04</a:t>
+              <a:t>2019/04/04</a:t>
             </a:fld>
             <a:endParaRPr lang="en-ZA"/>
           </a:p>
@@ -6697,7 +6697,7 @@
         <p:spPr/>
         <p:txBody>
           <a:bodyPr>
-            <a:normAutofit lnSpcReduction="10000"/>
+            <a:normAutofit/>
           </a:bodyPr>
           <a:lstStyle/>
           <a:p>
@@ -6710,6 +6710,34 @@
             <a:pPr marL="0" indent="0">
               <a:buNone/>
             </a:pPr>
+            <a:r>
+              <a:rPr lang="en-ZA" dirty="0"/>
+              <a:t>Reinhardt </a:t>
+            </a:r>
+            <a:r>
+              <a:rPr lang="en-ZA" dirty="0" err="1"/>
+              <a:t>Eiselen</a:t>
+            </a:r>
+            <a:r>
+              <a:rPr lang="en-ZA" dirty="0"/>
+              <a:t> (u14043302) – </a:t>
+            </a:r>
+            <a:r>
+              <a:rPr lang="en-ZA" dirty="0" smtClean="0"/>
+              <a:t>Code </a:t>
+            </a:r>
+            <a:r>
+              <a:rPr lang="en-ZA" dirty="0"/>
+              <a:t>modulation, Landing page, Unit Testing, Integration </a:t>
+            </a:r>
+            <a:r>
+              <a:rPr lang="en-ZA" dirty="0" smtClean="0"/>
+              <a:t>Testing, API </a:t>
+            </a:r>
+            <a:r>
+              <a:rPr lang="en-ZA" dirty="0" err="1" smtClean="0"/>
+              <a:t>Implenetation</a:t>
+            </a:r>
             <a:endParaRPr lang="en-ZA" dirty="0"/>
           </a:p>
           <a:p>
@@ -6726,7 +6754,7 @@
             </a:r>
             <a:r>
               <a:rPr lang="en-ZA" dirty="0" smtClean="0"/>
-              <a:t> (u11026953) – GitHub documentation, API services, Client tests</a:t>
+              <a:t> (u11026953) – GitHub organization, API Documentation, Hosting environment, Continuous Integration and API implementation</a:t>
             </a:r>
           </a:p>
           <a:p>
@@ -6747,28 +6775,7 @@
             </a:r>
             <a:r>
               <a:rPr lang="en-ZA" dirty="0" smtClean="0"/>
-              <a:t> (u10068083) – Server display, Server feedback, Database functions</a:t>
-            </a:r>
-          </a:p>
-          <a:p>
-            <a:pPr marL="0" indent="0">
-              <a:buNone/>
-            </a:pPr>
-            <a:r>
-              <a:rPr lang="en-ZA" dirty="0" smtClean="0"/>
-              <a:t>Reinhardt </a:t>
-            </a:r>
-            <a:r>
-              <a:rPr lang="en-ZA" dirty="0" err="1" smtClean="0"/>
-              <a:t>Eiselen</a:t>
-            </a:r>
-            <a:r>
-              <a:rPr lang="en-ZA" dirty="0"/>
-              <a:t> </a:t>
-            </a:r>
-            <a:r>
-              <a:rPr lang="en-ZA" dirty="0" smtClean="0"/>
-              <a:t>(u14043302) – Code modulation, Landing page, Unit Testing, Integration Testing </a:t>
+              <a:t> (u10068083) – Website Design, Website CRUD, Server CRUD, Server testing and Project board</a:t>
             </a:r>
           </a:p>
           <a:p>
@@ -6789,7 +6796,15 @@
             </a:r>
             <a:r>
               <a:rPr lang="en-ZA" dirty="0" smtClean="0"/>
-              <a:t> (u14309999) – Database triggers, Server testing, Code review</a:t>
+              <a:t> (u14309999) – Database triggers</a:t>
+            </a:r>
+            <a:r>
+              <a:rPr lang="en-ZA" dirty="0" smtClean="0"/>
+              <a:t>, Website CRUD, </a:t>
+            </a:r>
+            <a:r>
+              <a:rPr lang="en-ZA" dirty="0" smtClean="0"/>
+              <a:t>Server testing, Code review and Quality Standards</a:t>
             </a:r>
           </a:p>
           <a:p>
@@ -6798,7 +6813,11 @@
             </a:pPr>
             <a:r>
               <a:rPr lang="en-ZA" dirty="0" smtClean="0"/>
-              <a:t>Ryan Hartley (u15016880) – Database schema, Database testing, Admin, Integration Testing</a:t>
+              <a:t>Ryan Hartley (u15016880) – Database schema, Database testing, Administration, Integration </a:t>
+            </a:r>
+            <a:r>
+              <a:rPr lang="en-ZA" dirty="0" smtClean="0"/>
+              <a:t>Testing and Quality Standards</a:t>
             </a:r>
             <a:endParaRPr lang="en-ZA" dirty="0"/>
           </a:p>
@@ -7164,19 +7183,7 @@
             </a:pPr>
             <a:r>
               <a:rPr lang="en-ZA" dirty="0" smtClean="0"/>
-              <a:t>There is a master folder for which the </a:t>
-            </a:r>
-            <a:r>
-              <a:rPr lang="en-ZA" dirty="0" smtClean="0"/>
-              <a:t>completed, working </a:t>
-            </a:r>
-            <a:r>
-              <a:rPr lang="en-ZA" dirty="0" smtClean="0"/>
-              <a:t>aspects of the project appear</a:t>
-            </a:r>
-            <a:r>
-              <a:rPr lang="en-ZA" dirty="0" smtClean="0"/>
-              <a:t>.</a:t>
+              <a:t>There is a master folder for which the completed, working aspects of the project appear.</a:t>
             </a:r>
           </a:p>
           <a:p>
@@ -7194,11 +7201,7 @@
             </a:pPr>
             <a:r>
               <a:rPr lang="en-ZA" dirty="0" smtClean="0"/>
-              <a:t>Each element was worked on in a separate branch, before being merged into the stagin</a:t>
-            </a:r>
-            <a:r>
-              <a:rPr lang="en-ZA" dirty="0" smtClean="0"/>
-              <a:t>g branch.</a:t>
+              <a:t>Each element was worked on in a separate branch, before being merged into the staging branch.</a:t>
             </a:r>
             <a:endParaRPr lang="en-ZA" dirty="0"/>
           </a:p>
@@ -7631,27 +7634,7 @@
           <a:p>
             <a:r>
               <a:rPr lang="en-ZA" dirty="0" smtClean="0"/>
-              <a:t>Integration between the </a:t>
-            </a:r>
-            <a:r>
-              <a:rPr lang="en-ZA" dirty="0" smtClean="0"/>
-              <a:t>CIS, </a:t>
-            </a:r>
-            <a:r>
-              <a:rPr lang="en-ZA" dirty="0" smtClean="0"/>
-              <a:t>CA</a:t>
-            </a:r>
-            <a:r>
-              <a:rPr lang="en-ZA" dirty="0" smtClean="0"/>
-              <a:t>S</a:t>
-            </a:r>
-            <a:r>
-              <a:rPr lang="en-ZA" dirty="0" smtClean="0"/>
-              <a:t>, Facial recognition system and </a:t>
-            </a:r>
-            <a:r>
-              <a:rPr lang="en-ZA" dirty="0" smtClean="0"/>
-              <a:t>Card(authentication system).</a:t>
+              <a:t>Integration between the CIS, CAS, Facial recognition system and Card(authentication system).</a:t>
             </a:r>
             <a:endParaRPr lang="en-ZA" dirty="0"/>
           </a:p>

</xml_diff>